<commit_message>
Chap01: Corrections done until almost end of Sec.I
</commit_message>
<xml_diff>
--- a/01-QD/Pictures/CrystalAndHybridization.pptx
+++ b/01-QD/Pictures/CrystalAndHybridization.pptx
@@ -288,7 +288,7 @@
           <a:p>
             <a:fld id="{94A5010A-91AA-45BD-B0F9-FB4FE77BC09B}" type="datetimeFigureOut">
               <a:rPr lang="fr-FR" smtClean="0"/>
-              <a:t>02/10/2017</a:t>
+              <a:t>06/10/2017</a:t>
             </a:fld>
             <a:endParaRPr lang="fr-FR"/>
           </a:p>
@@ -458,7 +458,7 @@
           <a:p>
             <a:fld id="{94A5010A-91AA-45BD-B0F9-FB4FE77BC09B}" type="datetimeFigureOut">
               <a:rPr lang="fr-FR" smtClean="0"/>
-              <a:t>02/10/2017</a:t>
+              <a:t>06/10/2017</a:t>
             </a:fld>
             <a:endParaRPr lang="fr-FR"/>
           </a:p>
@@ -638,7 +638,7 @@
           <a:p>
             <a:fld id="{94A5010A-91AA-45BD-B0F9-FB4FE77BC09B}" type="datetimeFigureOut">
               <a:rPr lang="fr-FR" smtClean="0"/>
-              <a:t>02/10/2017</a:t>
+              <a:t>06/10/2017</a:t>
             </a:fld>
             <a:endParaRPr lang="fr-FR"/>
           </a:p>
@@ -808,7 +808,7 @@
           <a:p>
             <a:fld id="{94A5010A-91AA-45BD-B0F9-FB4FE77BC09B}" type="datetimeFigureOut">
               <a:rPr lang="fr-FR" smtClean="0"/>
-              <a:t>02/10/2017</a:t>
+              <a:t>06/10/2017</a:t>
             </a:fld>
             <a:endParaRPr lang="fr-FR"/>
           </a:p>
@@ -1054,7 +1054,7 @@
           <a:p>
             <a:fld id="{94A5010A-91AA-45BD-B0F9-FB4FE77BC09B}" type="datetimeFigureOut">
               <a:rPr lang="fr-FR" smtClean="0"/>
-              <a:t>02/10/2017</a:t>
+              <a:t>06/10/2017</a:t>
             </a:fld>
             <a:endParaRPr lang="fr-FR"/>
           </a:p>
@@ -1342,7 +1342,7 @@
           <a:p>
             <a:fld id="{94A5010A-91AA-45BD-B0F9-FB4FE77BC09B}" type="datetimeFigureOut">
               <a:rPr lang="fr-FR" smtClean="0"/>
-              <a:t>02/10/2017</a:t>
+              <a:t>06/10/2017</a:t>
             </a:fld>
             <a:endParaRPr lang="fr-FR"/>
           </a:p>
@@ -1764,7 +1764,7 @@
           <a:p>
             <a:fld id="{94A5010A-91AA-45BD-B0F9-FB4FE77BC09B}" type="datetimeFigureOut">
               <a:rPr lang="fr-FR" smtClean="0"/>
-              <a:t>02/10/2017</a:t>
+              <a:t>06/10/2017</a:t>
             </a:fld>
             <a:endParaRPr lang="fr-FR"/>
           </a:p>
@@ -1882,7 +1882,7 @@
           <a:p>
             <a:fld id="{94A5010A-91AA-45BD-B0F9-FB4FE77BC09B}" type="datetimeFigureOut">
               <a:rPr lang="fr-FR" smtClean="0"/>
-              <a:t>02/10/2017</a:t>
+              <a:t>06/10/2017</a:t>
             </a:fld>
             <a:endParaRPr lang="fr-FR"/>
           </a:p>
@@ -1977,7 +1977,7 @@
           <a:p>
             <a:fld id="{94A5010A-91AA-45BD-B0F9-FB4FE77BC09B}" type="datetimeFigureOut">
               <a:rPr lang="fr-FR" smtClean="0"/>
-              <a:t>02/10/2017</a:t>
+              <a:t>06/10/2017</a:t>
             </a:fld>
             <a:endParaRPr lang="fr-FR"/>
           </a:p>
@@ -2254,7 +2254,7 @@
           <a:p>
             <a:fld id="{94A5010A-91AA-45BD-B0F9-FB4FE77BC09B}" type="datetimeFigureOut">
               <a:rPr lang="fr-FR" smtClean="0"/>
-              <a:t>02/10/2017</a:t>
+              <a:t>06/10/2017</a:t>
             </a:fld>
             <a:endParaRPr lang="fr-FR"/>
           </a:p>
@@ -2507,7 +2507,7 @@
           <a:p>
             <a:fld id="{94A5010A-91AA-45BD-B0F9-FB4FE77BC09B}" type="datetimeFigureOut">
               <a:rPr lang="fr-FR" smtClean="0"/>
-              <a:t>02/10/2017</a:t>
+              <a:t>06/10/2017</a:t>
             </a:fld>
             <a:endParaRPr lang="fr-FR"/>
           </a:p>
@@ -2720,7 +2720,7 @@
           <a:p>
             <a:fld id="{94A5010A-91AA-45BD-B0F9-FB4FE77BC09B}" type="datetimeFigureOut">
               <a:rPr lang="fr-FR" smtClean="0"/>
-              <a:t>02/10/2017</a:t>
+              <a:t>06/10/2017</a:t>
             </a:fld>
             <a:endParaRPr lang="fr-FR"/>
           </a:p>
@@ -3140,7 +3140,7 @@
         </p:nvSpPr>
         <p:spPr>
           <a:xfrm>
-            <a:off x="4320555" y="303039"/>
+            <a:off x="4812433" y="-99392"/>
             <a:ext cx="372218" cy="461665"/>
           </a:xfrm>
           <a:prstGeom prst="rect">

</xml_diff>